<commit_message>
added coding highlights to finalPresentation
</commit_message>
<xml_diff>
--- a/doc/task09/FinalPresentation.pptx
+++ b/doc/task09/FinalPresentation.pptx
@@ -5,19 +5,20 @@
     <p:sldMasterId id="2147483648" r:id="rId1"/>
   </p:sldMasterIdLst>
   <p:notesMasterIdLst>
-    <p:notesMasterId r:id="rId9"/>
+    <p:notesMasterId r:id="rId10"/>
   </p:notesMasterIdLst>
   <p:handoutMasterIdLst>
-    <p:handoutMasterId r:id="rId10"/>
+    <p:handoutMasterId r:id="rId11"/>
   </p:handoutMasterIdLst>
   <p:sldIdLst>
     <p:sldId id="262" r:id="rId2"/>
     <p:sldId id="286" r:id="rId3"/>
     <p:sldId id="284" r:id="rId4"/>
     <p:sldId id="287" r:id="rId5"/>
-    <p:sldId id="288" r:id="rId6"/>
-    <p:sldId id="289" r:id="rId7"/>
-    <p:sldId id="285" r:id="rId8"/>
+    <p:sldId id="290" r:id="rId6"/>
+    <p:sldId id="288" r:id="rId7"/>
+    <p:sldId id="289" r:id="rId8"/>
+    <p:sldId id="285" r:id="rId9"/>
   </p:sldIdLst>
   <p:sldSz cx="12192000" cy="6858000"/>
   <p:notesSz cx="6858000" cy="9144000"/>
@@ -290,7 +291,7 @@
             <a:pPr rtl="0"/>
             <a:fld id="{7798501B-77B5-4365-9881-C6E19A3C1E42}" type="slidenum">
               <a:rPr lang="de-DE" smtClean="0"/>
-              <a:t>‹#›</a:t>
+              <a:t>‹Nr.›</a:t>
             </a:fld>
             <a:endParaRPr lang="de-DE" dirty="0"/>
           </a:p>
@@ -553,7 +554,7 @@
             <a:pPr rtl="0"/>
             <a:fld id="{FC8BD8E7-1312-41F3-99C4-6DA5AF891969}" type="slidenum">
               <a:rPr lang="de-DE" smtClean="0"/>
-              <a:t>‹#›</a:t>
+              <a:t>‹Nr.›</a:t>
             </a:fld>
             <a:endParaRPr lang="de-DE" dirty="0"/>
           </a:p>
@@ -993,7 +994,7 @@
     </p:spTree>
     <p:extLst>
       <p:ext uri="{BB962C8B-B14F-4D97-AF65-F5344CB8AC3E}">
-        <p14:creationId xmlns:p14="http://schemas.microsoft.com/office/powerpoint/2010/main" val="465767241"/>
+        <p14:creationId xmlns:p14="http://schemas.microsoft.com/office/powerpoint/2010/main" val="3983393483"/>
       </p:ext>
     </p:extLst>
   </p:cSld>
@@ -1070,6 +1071,91 @@
             <a:fld id="{FC8BD8E7-1312-41F3-99C4-6DA5AF891969}" type="slidenum">
               <a:rPr lang="de-DE" smtClean="0"/>
               <a:t>6</a:t>
+            </a:fld>
+            <a:endParaRPr lang="de-DE" dirty="0"/>
+          </a:p>
+        </p:txBody>
+      </p:sp>
+    </p:spTree>
+    <p:extLst>
+      <p:ext uri="{BB962C8B-B14F-4D97-AF65-F5344CB8AC3E}">
+        <p14:creationId xmlns:p14="http://schemas.microsoft.com/office/powerpoint/2010/main" val="465767241"/>
+      </p:ext>
+    </p:extLst>
+  </p:cSld>
+  <p:clrMapOvr>
+    <a:masterClrMapping/>
+  </p:clrMapOvr>
+</p:notes>
+</file>
+
+<file path=ppt/notesSlides/notesSlide6.xml><?xml version="1.0" encoding="utf-8"?>
+<p:notes xmlns:a="http://schemas.openxmlformats.org/drawingml/2006/main" xmlns:r="http://schemas.openxmlformats.org/officeDocument/2006/relationships" xmlns:p="http://schemas.openxmlformats.org/presentationml/2006/main">
+  <p:cSld>
+    <p:spTree>
+      <p:nvGrpSpPr>
+        <p:cNvPr id="1" name=""/>
+        <p:cNvGrpSpPr/>
+        <p:nvPr/>
+      </p:nvGrpSpPr>
+      <p:grpSpPr>
+        <a:xfrm>
+          <a:off x="0" y="0"/>
+          <a:ext cx="0" cy="0"/>
+          <a:chOff x="0" y="0"/>
+          <a:chExt cx="0" cy="0"/>
+        </a:xfrm>
+      </p:grpSpPr>
+      <p:sp>
+        <p:nvSpPr>
+          <p:cNvPr id="2" name="Folienbildplatzhalter 1"/>
+          <p:cNvSpPr>
+            <a:spLocks noGrp="1" noRot="1" noChangeAspect="1"/>
+          </p:cNvSpPr>
+          <p:nvPr>
+            <p:ph type="sldImg"/>
+          </p:nvPr>
+        </p:nvSpPr>
+        <p:spPr/>
+      </p:sp>
+      <p:sp>
+        <p:nvSpPr>
+          <p:cNvPr id="3" name="Notizenplatzhalter 2"/>
+          <p:cNvSpPr>
+            <a:spLocks noGrp="1"/>
+          </p:cNvSpPr>
+          <p:nvPr>
+            <p:ph type="body" idx="1"/>
+          </p:nvPr>
+        </p:nvSpPr>
+        <p:spPr/>
+        <p:txBody>
+          <a:bodyPr/>
+          <a:lstStyle/>
+          <a:p>
+            <a:endParaRPr lang="de-DE" dirty="0"/>
+          </a:p>
+        </p:txBody>
+      </p:sp>
+      <p:sp>
+        <p:nvSpPr>
+          <p:cNvPr id="4" name="Foliennummernplatzhalter 3"/>
+          <p:cNvSpPr>
+            <a:spLocks noGrp="1"/>
+          </p:cNvSpPr>
+          <p:nvPr>
+            <p:ph type="sldNum" sz="quarter" idx="10"/>
+          </p:nvPr>
+        </p:nvSpPr>
+        <p:spPr/>
+        <p:txBody>
+          <a:bodyPr/>
+          <a:lstStyle/>
+          <a:p>
+            <a:pPr rtl="0"/>
+            <a:fld id="{FC8BD8E7-1312-41F3-99C4-6DA5AF891969}" type="slidenum">
+              <a:rPr lang="de-DE" smtClean="0"/>
+              <a:t>7</a:t>
             </a:fld>
             <a:endParaRPr lang="de-DE" dirty="0"/>
           </a:p>
@@ -1732,7 +1818,7 @@
             <a:pPr rtl="0"/>
             <a:fld id="{E31375A4-56A4-47D6-9801-1991572033F7}" type="slidenum">
               <a:rPr lang="de-DE" smtClean="0"/>
-              <a:t>‹#›</a:t>
+              <a:t>‹Nr.›</a:t>
             </a:fld>
             <a:endParaRPr lang="de-DE" dirty="0"/>
           </a:p>
@@ -1939,7 +2025,7 @@
             <a:pPr rtl="0"/>
             <a:fld id="{E31375A4-56A4-47D6-9801-1991572033F7}" type="slidenum">
               <a:rPr lang="de-DE" smtClean="0"/>
-              <a:t>‹#›</a:t>
+              <a:t>‹Nr.›</a:t>
             </a:fld>
             <a:endParaRPr lang="de-DE" dirty="0"/>
           </a:p>
@@ -2549,7 +2635,7 @@
             <a:pPr rtl="0"/>
             <a:fld id="{E31375A4-56A4-47D6-9801-1991572033F7}" type="slidenum">
               <a:rPr lang="de-DE" smtClean="0"/>
-              <a:t>‹#›</a:t>
+              <a:t>‹Nr.›</a:t>
             </a:fld>
             <a:endParaRPr lang="de-DE" dirty="0"/>
           </a:p>
@@ -3072,7 +3158,7 @@
             <a:pPr rtl="0"/>
             <a:fld id="{E31375A4-56A4-47D6-9801-1991572033F7}" type="slidenum">
               <a:rPr lang="de-DE" smtClean="0"/>
-              <a:t>‹#›</a:t>
+              <a:t>‹Nr.›</a:t>
             </a:fld>
             <a:endParaRPr lang="de-DE" dirty="0"/>
           </a:p>
@@ -3530,7 +3616,7 @@
             <a:pPr rtl="0"/>
             <a:fld id="{E31375A4-56A4-47D6-9801-1991572033F7}" type="slidenum">
               <a:rPr lang="de-DE" smtClean="0"/>
-              <a:t>‹#›</a:t>
+              <a:t>‹Nr.›</a:t>
             </a:fld>
             <a:endParaRPr lang="de-DE" dirty="0"/>
           </a:p>
@@ -3668,7 +3754,7 @@
             <a:pPr rtl="0"/>
             <a:fld id="{E31375A4-56A4-47D6-9801-1991572033F7}" type="slidenum">
               <a:rPr lang="de-DE" smtClean="0"/>
-              <a:t>‹#›</a:t>
+              <a:t>‹Nr.›</a:t>
             </a:fld>
             <a:endParaRPr lang="de-DE" dirty="0"/>
           </a:p>
@@ -4014,7 +4100,7 @@
             <a:pPr rtl="0"/>
             <a:fld id="{E31375A4-56A4-47D6-9801-1991572033F7}" type="slidenum">
               <a:rPr lang="de-DE" smtClean="0"/>
-              <a:t>‹#›</a:t>
+              <a:t>‹Nr.›</a:t>
             </a:fld>
             <a:endParaRPr lang="de-DE" dirty="0"/>
           </a:p>
@@ -4325,7 +4411,7 @@
             <a:fld id="{E31375A4-56A4-47D6-9801-1991572033F7}" type="slidenum">
               <a:rPr lang="de-DE" smtClean="0"/>
               <a:pPr rtl="0"/>
-              <a:t>‹#›</a:t>
+              <a:t>‹Nr.›</a:t>
             </a:fld>
             <a:endParaRPr lang="de-DE" dirty="0"/>
           </a:p>
@@ -5211,6 +5297,40 @@
           <a:lstStyle/>
           <a:p>
             <a:pPr rtl="0"/>
+            <a:r>
+              <a:rPr lang="de-DE" dirty="0"/>
+              <a:t>3 Tier</a:t>
+            </a:r>
+          </a:p>
+          <a:p>
+            <a:pPr rtl="0"/>
+            <a:r>
+              <a:rPr lang="de-DE" dirty="0"/>
+              <a:t>DB: H2</a:t>
+            </a:r>
+          </a:p>
+          <a:p>
+            <a:pPr rtl="0"/>
+            <a:r>
+              <a:rPr lang="de-DE" dirty="0"/>
+              <a:t>ORM: </a:t>
+            </a:r>
+            <a:r>
+              <a:rPr lang="de-DE" dirty="0" err="1"/>
+              <a:t>Hibernate</a:t>
+            </a:r>
+            <a:endParaRPr lang="de-DE" dirty="0"/>
+          </a:p>
+          <a:p>
+            <a:pPr rtl="0"/>
+            <a:r>
+              <a:rPr lang="de-DE" dirty="0"/>
+              <a:t>UI Framework: </a:t>
+            </a:r>
+            <a:r>
+              <a:rPr lang="de-DE" dirty="0" err="1"/>
+              <a:t>Vaadin</a:t>
+            </a:r>
             <a:endParaRPr lang="de-DE" dirty="0"/>
           </a:p>
         </p:txBody>
@@ -5284,45 +5404,155 @@
               <a:rPr lang="de-CH" dirty="0" err="1"/>
               <a:t>highlights</a:t>
             </a:r>
-            <a:endParaRPr lang="de-DE" dirty="0"/>
-          </a:p>
-        </p:txBody>
-      </p:sp>
-      <p:sp>
-        <p:nvSpPr>
-          <p:cNvPr id="3" name="Inhaltsplatzhalter 2"/>
-          <p:cNvSpPr>
-            <a:spLocks noGrp="1"/>
-          </p:cNvSpPr>
-          <p:nvPr>
-            <p:ph idx="1"/>
-          </p:nvPr>
-        </p:nvSpPr>
-        <p:spPr/>
-        <p:txBody>
-          <a:bodyPr rtlCol="0"/>
+            <a:r>
+              <a:rPr lang="de-CH" dirty="0"/>
+              <a:t> (</a:t>
+            </a:r>
+            <a:r>
+              <a:rPr lang="de-CH" dirty="0" err="1"/>
+              <a:t>JpaUtility</a:t>
+            </a:r>
+            <a:r>
+              <a:rPr lang="de-CH" dirty="0"/>
+              <a:t>)</a:t>
+            </a:r>
+            <a:endParaRPr lang="de-DE" dirty="0"/>
+          </a:p>
+        </p:txBody>
+      </p:sp>
+      <p:pic>
+        <p:nvPicPr>
+          <p:cNvPr id="4" name="Grafik 3">
+            <a:extLst>
+              <a:ext uri="{FF2B5EF4-FFF2-40B4-BE49-F238E27FC236}">
+                <a16:creationId xmlns:a16="http://schemas.microsoft.com/office/drawing/2014/main" id="{D80DC675-3249-4BF9-BA9D-CEA5DF8DE836}"/>
+              </a:ext>
+            </a:extLst>
+          </p:cNvPr>
+          <p:cNvPicPr>
+            <a:picLocks noChangeAspect="1"/>
+          </p:cNvPicPr>
+          <p:nvPr/>
+        </p:nvPicPr>
+        <p:blipFill>
+          <a:blip r:embed="rId3"/>
+          <a:stretch>
+            <a:fillRect/>
+          </a:stretch>
+        </p:blipFill>
+        <p:spPr>
+          <a:xfrm>
+            <a:off x="321872" y="2387360"/>
+            <a:ext cx="4695825" cy="3838575"/>
+          </a:xfrm>
+          <a:prstGeom prst="rect">
+            <a:avLst/>
+          </a:prstGeom>
+        </p:spPr>
+      </p:pic>
+      <p:pic>
+        <p:nvPicPr>
+          <p:cNvPr id="7" name="Grafik 6">
+            <a:extLst>
+              <a:ext uri="{FF2B5EF4-FFF2-40B4-BE49-F238E27FC236}">
+                <a16:creationId xmlns:a16="http://schemas.microsoft.com/office/drawing/2014/main" id="{3433DEFE-B336-41DD-90E3-A5E0DD514D09}"/>
+              </a:ext>
+            </a:extLst>
+          </p:cNvPr>
+          <p:cNvPicPr>
+            <a:picLocks noChangeAspect="1"/>
+          </p:cNvPicPr>
+          <p:nvPr/>
+        </p:nvPicPr>
+        <p:blipFill>
+          <a:blip r:embed="rId4"/>
+          <a:stretch>
+            <a:fillRect/>
+          </a:stretch>
+        </p:blipFill>
+        <p:spPr>
+          <a:xfrm>
+            <a:off x="5371381" y="3354147"/>
+            <a:ext cx="6600825" cy="1905000"/>
+          </a:xfrm>
+          <a:prstGeom prst="rect">
+            <a:avLst/>
+          </a:prstGeom>
+        </p:spPr>
+      </p:pic>
+      <p:sp>
+        <p:nvSpPr>
+          <p:cNvPr id="8" name="Textfeld 7">
+            <a:extLst>
+              <a:ext uri="{FF2B5EF4-FFF2-40B4-BE49-F238E27FC236}">
+                <a16:creationId xmlns:a16="http://schemas.microsoft.com/office/drawing/2014/main" id="{127980DF-8510-4157-BB49-530F3501DAEC}"/>
+              </a:ext>
+            </a:extLst>
+          </p:cNvPr>
+          <p:cNvSpPr txBox="1"/>
+          <p:nvPr/>
+        </p:nvSpPr>
+        <p:spPr>
+          <a:xfrm>
+            <a:off x="422694" y="2009955"/>
+            <a:ext cx="1055097" cy="369332"/>
+          </a:xfrm>
+          <a:prstGeom prst="rect">
+            <a:avLst/>
+          </a:prstGeom>
+          <a:noFill/>
+        </p:spPr>
+        <p:txBody>
+          <a:bodyPr wrap="none" rtlCol="0">
+            <a:spAutoFit/>
+          </a:bodyPr>
           <a:lstStyle/>
           <a:p>
             <a:r>
-              <a:rPr lang="de-CH" dirty="0" err="1"/>
-              <a:t>patterns</a:t>
-            </a:r>
-            <a:r>
-              <a:rPr lang="de-CH" dirty="0"/>
-              <a:t> etc.</a:t>
-            </a:r>
-          </a:p>
-          <a:p>
-            <a:pPr lvl="1"/>
-            <a:r>
-              <a:rPr lang="de-CH" dirty="0" err="1"/>
-              <a:t>dfs</a:t>
-            </a:r>
-            <a:r>
-              <a:rPr lang="de-CH" dirty="0"/>
-              <a:t> </a:t>
-            </a:r>
-            <a:endParaRPr lang="de-DE" dirty="0"/>
+              <a:rPr lang="en-GB" dirty="0" err="1"/>
+              <a:t>JpaUtility</a:t>
+            </a:r>
+            <a:endParaRPr lang="en-GB" dirty="0"/>
+          </a:p>
+        </p:txBody>
+      </p:sp>
+      <p:sp>
+        <p:nvSpPr>
+          <p:cNvPr id="9" name="Textfeld 8">
+            <a:extLst>
+              <a:ext uri="{FF2B5EF4-FFF2-40B4-BE49-F238E27FC236}">
+                <a16:creationId xmlns:a16="http://schemas.microsoft.com/office/drawing/2014/main" id="{F31B1C59-C91F-4882-B720-BBF01FD7D2A6}"/>
+              </a:ext>
+            </a:extLst>
+          </p:cNvPr>
+          <p:cNvSpPr txBox="1"/>
+          <p:nvPr/>
+        </p:nvSpPr>
+        <p:spPr>
+          <a:xfrm>
+            <a:off x="5371381" y="2921479"/>
+            <a:ext cx="2961901" cy="369332"/>
+          </a:xfrm>
+          <a:prstGeom prst="rect">
+            <a:avLst/>
+          </a:prstGeom>
+          <a:noFill/>
+        </p:spPr>
+        <p:txBody>
+          <a:bodyPr wrap="none" rtlCol="0">
+            <a:spAutoFit/>
+          </a:bodyPr>
+          <a:lstStyle/>
+          <a:p>
+            <a:r>
+              <a:rPr lang="en-GB" dirty="0"/>
+              <a:t>Example usage in </a:t>
+            </a:r>
+            <a:r>
+              <a:rPr lang="en-GB" dirty="0" err="1"/>
+              <a:t>UserService</a:t>
+            </a:r>
+            <a:endParaRPr lang="en-GB" dirty="0"/>
           </a:p>
         </p:txBody>
       </p:sp>
@@ -5352,6 +5582,227 @@
 </file>
 
 <file path=ppt/slides/slide5.xml><?xml version="1.0" encoding="utf-8"?>
+<p:sld xmlns:a="http://schemas.openxmlformats.org/drawingml/2006/main" xmlns:r="http://schemas.openxmlformats.org/officeDocument/2006/relationships" xmlns:p="http://schemas.openxmlformats.org/presentationml/2006/main">
+  <p:cSld>
+    <p:spTree>
+      <p:nvGrpSpPr>
+        <p:cNvPr id="1" name=""/>
+        <p:cNvGrpSpPr/>
+        <p:nvPr/>
+      </p:nvGrpSpPr>
+      <p:grpSpPr>
+        <a:xfrm>
+          <a:off x="0" y="0"/>
+          <a:ext cx="0" cy="0"/>
+          <a:chOff x="0" y="0"/>
+          <a:chExt cx="0" cy="0"/>
+        </a:xfrm>
+      </p:grpSpPr>
+      <p:sp>
+        <p:nvSpPr>
+          <p:cNvPr id="2" name="Titel 1"/>
+          <p:cNvSpPr>
+            <a:spLocks noGrp="1"/>
+          </p:cNvSpPr>
+          <p:nvPr>
+            <p:ph type="title"/>
+          </p:nvPr>
+        </p:nvSpPr>
+        <p:spPr/>
+        <p:txBody>
+          <a:bodyPr rtlCol="0"/>
+          <a:lstStyle/>
+          <a:p>
+            <a:r>
+              <a:rPr lang="de-CH" dirty="0" err="1"/>
+              <a:t>coding</a:t>
+            </a:r>
+            <a:r>
+              <a:rPr lang="de-CH" dirty="0"/>
+              <a:t> </a:t>
+            </a:r>
+            <a:r>
+              <a:rPr lang="de-CH" dirty="0" err="1"/>
+              <a:t>highlights</a:t>
+            </a:r>
+            <a:r>
+              <a:rPr lang="de-CH" dirty="0"/>
+              <a:t> (</a:t>
+            </a:r>
+            <a:r>
+              <a:rPr lang="de-CH" dirty="0" err="1"/>
+              <a:t>Baseservice</a:t>
+            </a:r>
+            <a:r>
+              <a:rPr lang="de-CH" dirty="0"/>
+              <a:t>)</a:t>
+            </a:r>
+            <a:endParaRPr lang="de-DE" dirty="0"/>
+          </a:p>
+        </p:txBody>
+      </p:sp>
+      <p:pic>
+        <p:nvPicPr>
+          <p:cNvPr id="3" name="Grafik 2">
+            <a:extLst>
+              <a:ext uri="{FF2B5EF4-FFF2-40B4-BE49-F238E27FC236}">
+                <a16:creationId xmlns:a16="http://schemas.microsoft.com/office/drawing/2014/main" id="{B8A6154A-C4C7-4E39-AAD9-DC1A5F1E26B6}"/>
+              </a:ext>
+            </a:extLst>
+          </p:cNvPr>
+          <p:cNvPicPr>
+            <a:picLocks noChangeAspect="1"/>
+          </p:cNvPicPr>
+          <p:nvPr/>
+        </p:nvPicPr>
+        <p:blipFill>
+          <a:blip r:embed="rId3"/>
+          <a:stretch>
+            <a:fillRect/>
+          </a:stretch>
+        </p:blipFill>
+        <p:spPr>
+          <a:xfrm>
+            <a:off x="550113" y="3074688"/>
+            <a:ext cx="5041517" cy="2679131"/>
+          </a:xfrm>
+          <a:prstGeom prst="rect">
+            <a:avLst/>
+          </a:prstGeom>
+        </p:spPr>
+      </p:pic>
+      <p:pic>
+        <p:nvPicPr>
+          <p:cNvPr id="5" name="Grafik 4">
+            <a:extLst>
+              <a:ext uri="{FF2B5EF4-FFF2-40B4-BE49-F238E27FC236}">
+                <a16:creationId xmlns:a16="http://schemas.microsoft.com/office/drawing/2014/main" id="{9DA607ED-8AC4-449F-88F6-D55D9808218F}"/>
+              </a:ext>
+            </a:extLst>
+          </p:cNvPr>
+          <p:cNvPicPr>
+            <a:picLocks noChangeAspect="1"/>
+          </p:cNvPicPr>
+          <p:nvPr/>
+        </p:nvPicPr>
+        <p:blipFill>
+          <a:blip r:embed="rId4"/>
+          <a:stretch>
+            <a:fillRect/>
+          </a:stretch>
+        </p:blipFill>
+        <p:spPr>
+          <a:xfrm>
+            <a:off x="5969029" y="3678537"/>
+            <a:ext cx="5890608" cy="2075282"/>
+          </a:xfrm>
+          <a:prstGeom prst="rect">
+            <a:avLst/>
+          </a:prstGeom>
+        </p:spPr>
+      </p:pic>
+      <p:sp>
+        <p:nvSpPr>
+          <p:cNvPr id="8" name="Textfeld 7">
+            <a:extLst>
+              <a:ext uri="{FF2B5EF4-FFF2-40B4-BE49-F238E27FC236}">
+                <a16:creationId xmlns:a16="http://schemas.microsoft.com/office/drawing/2014/main" id="{C0E18492-DE44-447E-AC71-689DD9A7AC48}"/>
+              </a:ext>
+            </a:extLst>
+          </p:cNvPr>
+          <p:cNvSpPr txBox="1"/>
+          <p:nvPr/>
+        </p:nvSpPr>
+        <p:spPr>
+          <a:xfrm>
+            <a:off x="550113" y="2622431"/>
+            <a:ext cx="1299266" cy="369332"/>
+          </a:xfrm>
+          <a:prstGeom prst="rect">
+            <a:avLst/>
+          </a:prstGeom>
+          <a:noFill/>
+        </p:spPr>
+        <p:txBody>
+          <a:bodyPr wrap="none" rtlCol="0">
+            <a:spAutoFit/>
+          </a:bodyPr>
+          <a:lstStyle/>
+          <a:p>
+            <a:r>
+              <a:rPr lang="en-GB" dirty="0" err="1"/>
+              <a:t>BaseService</a:t>
+            </a:r>
+            <a:endParaRPr lang="en-GB" dirty="0"/>
+          </a:p>
+        </p:txBody>
+      </p:sp>
+      <p:sp>
+        <p:nvSpPr>
+          <p:cNvPr id="9" name="Textfeld 8">
+            <a:extLst>
+              <a:ext uri="{FF2B5EF4-FFF2-40B4-BE49-F238E27FC236}">
+                <a16:creationId xmlns:a16="http://schemas.microsoft.com/office/drawing/2014/main" id="{12BA022E-27C8-42FB-BB8A-1BE8BFC371A4}"/>
+              </a:ext>
+            </a:extLst>
+          </p:cNvPr>
+          <p:cNvSpPr txBox="1"/>
+          <p:nvPr/>
+        </p:nvSpPr>
+        <p:spPr>
+          <a:xfrm>
+            <a:off x="5969029" y="3244334"/>
+            <a:ext cx="4418454" cy="369332"/>
+          </a:xfrm>
+          <a:prstGeom prst="rect">
+            <a:avLst/>
+          </a:prstGeom>
+          <a:noFill/>
+        </p:spPr>
+        <p:txBody>
+          <a:bodyPr wrap="none" rtlCol="0">
+            <a:spAutoFit/>
+          </a:bodyPr>
+          <a:lstStyle/>
+          <a:p>
+            <a:r>
+              <a:rPr lang="en-GB" dirty="0"/>
+              <a:t>Implementation example in </a:t>
+            </a:r>
+            <a:r>
+              <a:rPr lang="en-GB" dirty="0" err="1"/>
+              <a:t>BaseServiceImpl</a:t>
+            </a:r>
+            <a:endParaRPr lang="en-GB" dirty="0"/>
+          </a:p>
+        </p:txBody>
+      </p:sp>
+    </p:spTree>
+    <p:extLst>
+      <p:ext uri="{BB962C8B-B14F-4D97-AF65-F5344CB8AC3E}">
+        <p14:creationId xmlns:p14="http://schemas.microsoft.com/office/powerpoint/2010/main" val="2633281623"/>
+      </p:ext>
+    </p:extLst>
+  </p:cSld>
+  <p:clrMapOvr>
+    <a:masterClrMapping/>
+  </p:clrMapOvr>
+  <mc:AlternateContent xmlns:mc="http://schemas.openxmlformats.org/markup-compatibility/2006" xmlns:p14="http://schemas.microsoft.com/office/powerpoint/2010/main">
+    <mc:Choice Requires="p14">
+      <p:transition spd="med" p14:dur="700">
+        <p:fade/>
+      </p:transition>
+    </mc:Choice>
+    <mc:Fallback xmlns="">
+      <p:transition spd="med">
+        <p:fade/>
+      </p:transition>
+    </mc:Fallback>
+  </mc:AlternateContent>
+</p:sld>
+</file>
+
+<file path=ppt/slides/slide6.xml><?xml version="1.0" encoding="utf-8"?>
 <p:sld xmlns:a="http://schemas.openxmlformats.org/drawingml/2006/main" xmlns:r="http://schemas.openxmlformats.org/officeDocument/2006/relationships" xmlns:p="http://schemas.openxmlformats.org/presentationml/2006/main">
   <p:cSld>
     <p:spTree>
@@ -5915,7 +6366,7 @@
 </p:sld>
 </file>
 
-<file path=ppt/slides/slide6.xml><?xml version="1.0" encoding="utf-8"?>
+<file path=ppt/slides/slide7.xml><?xml version="1.0" encoding="utf-8"?>
 <p:sld xmlns:a="http://schemas.openxmlformats.org/drawingml/2006/main" xmlns:r="http://schemas.openxmlformats.org/officeDocument/2006/relationships" xmlns:p="http://schemas.openxmlformats.org/presentationml/2006/main">
   <p:cSld>
     <p:spTree>
@@ -6032,7 +6483,7 @@
 </p:sld>
 </file>
 
-<file path=ppt/slides/slide7.xml><?xml version="1.0" encoding="utf-8"?>
+<file path=ppt/slides/slide8.xml><?xml version="1.0" encoding="utf-8"?>
 <p:sld xmlns:a="http://schemas.openxmlformats.org/drawingml/2006/main" xmlns:r="http://schemas.openxmlformats.org/officeDocument/2006/relationships" xmlns:p="http://schemas.openxmlformats.org/presentationml/2006/main">
   <p:cSld>
     <p:spTree>

</xml_diff>

<commit_message>
Changes on presentation (Lessons learned)
</commit_message>
<xml_diff>
--- a/doc/task09/FinalPresentation.pptx
+++ b/doc/task09/FinalPresentation.pptx
@@ -223,7 +223,7 @@
             <a:pPr rtl="0"/>
             <a:fld id="{960672BD-261C-4EDC-9C5E-C246835120E7}" type="datetime1">
               <a:rPr lang="de-DE" smtClean="0"/>
-              <a:t>14.06.2018</a:t>
+              <a:t>15.06.2018</a:t>
             </a:fld>
             <a:endParaRPr lang="de-DE" dirty="0"/>
           </a:p>
@@ -393,7 +393,7 @@
             <a:pPr rtl="0"/>
             <a:fld id="{6B5664F4-ABD2-4F09-9758-D36145E15169}" type="datetime1">
               <a:rPr lang="de-DE" smtClean="0"/>
-              <a:t>14.06.2018</a:t>
+              <a:t>15.06.2018</a:t>
             </a:fld>
             <a:endParaRPr lang="de-DE" dirty="0"/>
           </a:p>
@@ -1794,7 +1794,7 @@
             <a:pPr rtl="0"/>
             <a:fld id="{6D86D372-411D-4B4E-9C3F-27EFF2F8BE1E}" type="datetime1">
               <a:rPr lang="de-DE" smtClean="0"/>
-              <a:t>14.06.2018</a:t>
+              <a:t>15.06.2018</a:t>
             </a:fld>
             <a:endParaRPr lang="de-DE" dirty="0"/>
           </a:p>
@@ -2001,7 +2001,7 @@
             <a:pPr rtl="0"/>
             <a:fld id="{E326EB1D-CBBF-438D-A188-239583155CD5}" type="datetime1">
               <a:rPr lang="de-DE" smtClean="0"/>
-              <a:t>14.06.2018</a:t>
+              <a:t>15.06.2018</a:t>
             </a:fld>
             <a:endParaRPr lang="de-DE" dirty="0"/>
           </a:p>
@@ -2611,7 +2611,7 @@
             <a:pPr rtl="0"/>
             <a:fld id="{0158FB9A-9055-4D91-A8D6-422B1A47ADD6}" type="datetime1">
               <a:rPr lang="de-DE" smtClean="0"/>
-              <a:t>14.06.2018</a:t>
+              <a:t>15.06.2018</a:t>
             </a:fld>
             <a:endParaRPr lang="de-DE" dirty="0"/>
           </a:p>
@@ -3134,7 +3134,7 @@
             <a:pPr rtl="0"/>
             <a:fld id="{F3AD2B2A-001E-4204-A9F7-ADB62FDFB3C2}" type="datetime1">
               <a:rPr lang="de-DE" smtClean="0"/>
-              <a:t>14.06.2018</a:t>
+              <a:t>15.06.2018</a:t>
             </a:fld>
             <a:endParaRPr lang="de-DE" dirty="0"/>
           </a:p>
@@ -3592,7 +3592,7 @@
             <a:pPr rtl="0"/>
             <a:fld id="{D0598511-F564-4313-9C85-1BB6BF3D8A32}" type="datetime1">
               <a:rPr lang="de-DE" smtClean="0"/>
-              <a:t>14.06.2018</a:t>
+              <a:t>15.06.2018</a:t>
             </a:fld>
             <a:endParaRPr lang="de-DE" dirty="0"/>
           </a:p>
@@ -3730,7 +3730,7 @@
             <a:pPr rtl="0"/>
             <a:fld id="{2E8B8011-CBA9-4FB0-934D-C2F23F0053DB}" type="datetime1">
               <a:rPr lang="de-DE" smtClean="0"/>
-              <a:t>14.06.2018</a:t>
+              <a:t>15.06.2018</a:t>
             </a:fld>
             <a:endParaRPr lang="de-DE" dirty="0"/>
           </a:p>
@@ -4076,7 +4076,7 @@
             <a:pPr rtl="0"/>
             <a:fld id="{62C0A95F-FFB2-4410-A448-2C54BE7723F4}" type="datetime1">
               <a:rPr lang="de-DE" smtClean="0"/>
-              <a:t>14.06.2018</a:t>
+              <a:t>15.06.2018</a:t>
             </a:fld>
             <a:endParaRPr lang="de-DE" dirty="0"/>
           </a:p>
@@ -4370,7 +4370,7 @@
             <a:pPr rtl="0"/>
             <a:fld id="{8C96ADC6-BDC4-42FB-97FB-DA73ECD9CEE8}" type="datetime1">
               <a:rPr lang="de-DE" smtClean="0"/>
-              <a:t>14.06.2018</a:t>
+              <a:t>15.06.2018</a:t>
             </a:fld>
             <a:endParaRPr lang="de-DE" dirty="0"/>
           </a:p>
@@ -5874,7 +5874,7 @@
             <p:ph idx="1"/>
             <p:extLst>
               <p:ext uri="{D42A27DB-BD31-4B8C-83A1-F6EECF244321}">
-                <p14:modId xmlns:p14="http://schemas.microsoft.com/office/powerpoint/2010/main" val="3906790330"/>
+                <p14:modId xmlns:p14="http://schemas.microsoft.com/office/powerpoint/2010/main" val="2915673509"/>
               </p:ext>
             </p:extLst>
           </p:nvPr>
@@ -6230,7 +6230,7 @@
                       </a:r>
                       <a:r>
                         <a:rPr lang="de-CH" dirty="0"/>
-                        <a:t> Test</a:t>
+                        <a:t> Test, Backlogs</a:t>
                       </a:r>
                     </a:p>
                   </a:txBody>
@@ -6426,7 +6426,9 @@
         </p:nvSpPr>
         <p:spPr/>
         <p:txBody>
-          <a:bodyPr rtlCol="0"/>
+          <a:bodyPr rtlCol="0">
+            <a:normAutofit fontScale="92500" lnSpcReduction="20000"/>
+          </a:bodyPr>
           <a:lstStyle/>
           <a:p>
             <a:r>
@@ -6440,12 +6442,54 @@
             <a:endParaRPr lang="de-CH" dirty="0"/>
           </a:p>
           <a:p>
+            <a:pPr lvl="1"/>
+            <a:r>
+              <a:rPr lang="de-CH" dirty="0"/>
+              <a:t>Verständnis der Rollen und deren Funktion</a:t>
+            </a:r>
+          </a:p>
+          <a:p>
+            <a:pPr lvl="1"/>
+            <a:r>
+              <a:rPr lang="de-CH" dirty="0"/>
+              <a:t>Vor- &amp; Nachteile der flexiblen Planung</a:t>
+            </a:r>
+          </a:p>
+          <a:p>
+            <a:pPr lvl="1"/>
+            <a:r>
+              <a:rPr lang="de-CH" dirty="0"/>
+              <a:t>Grösserer Planungsaufwand</a:t>
+            </a:r>
+          </a:p>
+          <a:p>
+            <a:pPr lvl="1"/>
+            <a:r>
+              <a:rPr lang="de-CH" dirty="0"/>
+              <a:t>Besseres Verständnis für Tätigkeit und Probleme der Teammitglieder (Daily)</a:t>
+            </a:r>
+          </a:p>
+          <a:p>
+            <a:pPr lvl="2"/>
+            <a:r>
+              <a:rPr lang="de-CH" dirty="0"/>
+              <a:t>Problemlösung im Team</a:t>
+            </a:r>
+          </a:p>
+          <a:p>
             <a:r>
               <a:rPr lang="de-CH" dirty="0"/>
               <a:t>MVP Konzept</a:t>
             </a:r>
           </a:p>
           <a:p>
+            <a:pPr lvl="1"/>
+            <a:r>
+              <a:rPr lang="de-CH" dirty="0"/>
+              <a:t>Auseinandersetzung mit neuem Design-Pattern und dessen konkrete Umsetzung</a:t>
+            </a:r>
+          </a:p>
+          <a:p>
             <a:r>
               <a:rPr lang="de-CH" dirty="0"/>
               <a:t> Zusammenarbeiten mit </a:t>
@@ -6454,6 +6498,68 @@
               <a:rPr lang="de-CH" dirty="0" err="1"/>
               <a:t>Github</a:t>
             </a:r>
+            <a:endParaRPr lang="de-CH" dirty="0"/>
+          </a:p>
+          <a:p>
+            <a:pPr lvl="1"/>
+            <a:r>
+              <a:rPr lang="de-CH" dirty="0"/>
+              <a:t>Vorteile und Schwierigkeiten von </a:t>
+            </a:r>
+            <a:r>
+              <a:rPr lang="de-CH" i="1" dirty="0"/>
+              <a:t>Version Control Systems</a:t>
+            </a:r>
+          </a:p>
+          <a:p>
+            <a:r>
+              <a:rPr lang="de-DE" dirty="0" err="1"/>
+              <a:t>Vaadin</a:t>
+            </a:r>
+            <a:r>
+              <a:rPr lang="de-DE" dirty="0"/>
+              <a:t> Framework</a:t>
+            </a:r>
+          </a:p>
+          <a:p>
+            <a:pPr lvl="1"/>
+            <a:r>
+              <a:rPr lang="de-DE" dirty="0"/>
+              <a:t>Designaufwand im Vergleich zu anderen Frameworks riesig</a:t>
+            </a:r>
+          </a:p>
+          <a:p>
+            <a:pPr lvl="1"/>
+            <a:r>
+              <a:rPr lang="de-DE" dirty="0"/>
+              <a:t>Kaum eine Community vorhanden</a:t>
+            </a:r>
+          </a:p>
+          <a:p>
+            <a:pPr lvl="1"/>
+            <a:r>
+              <a:rPr lang="de-DE"/>
+              <a:t>Nützliche </a:t>
+            </a:r>
+            <a:r>
+              <a:rPr lang="de-DE" dirty="0"/>
+              <a:t>Komponenten sind kostenpflichtig (Bsp. </a:t>
+            </a:r>
+            <a:r>
+              <a:rPr lang="de-DE" dirty="0" err="1"/>
+              <a:t>Vaadin</a:t>
+            </a:r>
+            <a:r>
+              <a:rPr lang="de-DE" dirty="0"/>
+              <a:t> Designer)</a:t>
+            </a:r>
+          </a:p>
+          <a:p>
+            <a:pPr lvl="1"/>
+            <a:endParaRPr lang="de-DE" dirty="0"/>
+          </a:p>
+          <a:p>
+            <a:pPr lvl="1"/>
             <a:endParaRPr lang="de-DE" dirty="0"/>
           </a:p>
         </p:txBody>
@@ -6570,15 +6676,15 @@
             </a:r>
             <a:r>
               <a:rPr lang="de-CH" sz="1800" cap="none" dirty="0"/>
-              <a:t>, Ivo </a:t>
+              <a:t>, Ivo Kozina, </a:t>
             </a:r>
             <a:r>
               <a:rPr lang="de-CH" sz="1800" cap="none" dirty="0" err="1"/>
-              <a:t>Kozina</a:t>
+              <a:t>Janick</a:t>
             </a:r>
             <a:r>
               <a:rPr lang="de-CH" sz="1800" cap="none" dirty="0"/>
-              <a:t>, Jannick </a:t>
+              <a:t> </a:t>
             </a:r>
             <a:r>
               <a:rPr lang="de-CH" sz="1800" cap="none" dirty="0" err="1"/>
@@ -6586,15 +6692,7 @@
             </a:r>
             <a:r>
               <a:rPr lang="de-CH" sz="1800" cap="none" dirty="0"/>
-              <a:t>, </a:t>
-            </a:r>
-            <a:r>
-              <a:rPr lang="de-CH" sz="1800" cap="none" dirty="0" err="1"/>
-              <a:t>Ohran</a:t>
-            </a:r>
-            <a:r>
-              <a:rPr lang="de-CH" sz="1800" cap="none"/>
-              <a:t> Mujkic</a:t>
+              <a:t>, Ohran Mujkic</a:t>
             </a:r>
           </a:p>
           <a:p>

</xml_diff>